<commit_message>
Minor edit to 4-storm powerpoint
</commit_message>
<xml_diff>
--- a/sampexlib/Concept Summaries/Summary of 4 Storms Selected.pptx
+++ b/sampexlib/Concept Summaries/Summary of 4 Storms Selected.pptx
@@ -110,6 +110,11 @@
       </a:defRPr>
     </a:lvl9pPr>
   </p:defaultTextStyle>
+  <p:extLst>
+    <p:ext uri="{EFAFB233-063F-42B5-8137-9DF3F51BA10A}">
+      <p15:sldGuideLst xmlns:p15="http://schemas.microsoft.com/office/powerpoint/2012/main"/>
+    </p:ext>
+  </p:extLst>
 </p:presentation>
 </file>
 
@@ -260,7 +265,7 @@
           <a:p>
             <a:fld id="{FF91FCBC-9B68-4ACD-8DD1-A95F477831F0}" type="datetimeFigureOut">
               <a:rPr lang="en-US" smtClean="0"/>
-              <a:t>10/12/2021</a:t>
+              <a:t>10/14/2021</a:t>
             </a:fld>
             <a:endParaRPr lang="en-US"/>
           </a:p>
@@ -458,7 +463,7 @@
           <a:p>
             <a:fld id="{FF91FCBC-9B68-4ACD-8DD1-A95F477831F0}" type="datetimeFigureOut">
               <a:rPr lang="en-US" smtClean="0"/>
-              <a:t>10/12/2021</a:t>
+              <a:t>10/14/2021</a:t>
             </a:fld>
             <a:endParaRPr lang="en-US"/>
           </a:p>
@@ -666,7 +671,7 @@
           <a:p>
             <a:fld id="{FF91FCBC-9B68-4ACD-8DD1-A95F477831F0}" type="datetimeFigureOut">
               <a:rPr lang="en-US" smtClean="0"/>
-              <a:t>10/12/2021</a:t>
+              <a:t>10/14/2021</a:t>
             </a:fld>
             <a:endParaRPr lang="en-US"/>
           </a:p>
@@ -864,7 +869,7 @@
           <a:p>
             <a:fld id="{FF91FCBC-9B68-4ACD-8DD1-A95F477831F0}" type="datetimeFigureOut">
               <a:rPr lang="en-US" smtClean="0"/>
-              <a:t>10/12/2021</a:t>
+              <a:t>10/14/2021</a:t>
             </a:fld>
             <a:endParaRPr lang="en-US"/>
           </a:p>
@@ -1139,7 +1144,7 @@
           <a:p>
             <a:fld id="{FF91FCBC-9B68-4ACD-8DD1-A95F477831F0}" type="datetimeFigureOut">
               <a:rPr lang="en-US" smtClean="0"/>
-              <a:t>10/12/2021</a:t>
+              <a:t>10/14/2021</a:t>
             </a:fld>
             <a:endParaRPr lang="en-US"/>
           </a:p>
@@ -1404,7 +1409,7 @@
           <a:p>
             <a:fld id="{FF91FCBC-9B68-4ACD-8DD1-A95F477831F0}" type="datetimeFigureOut">
               <a:rPr lang="en-US" smtClean="0"/>
-              <a:t>10/12/2021</a:t>
+              <a:t>10/14/2021</a:t>
             </a:fld>
             <a:endParaRPr lang="en-US"/>
           </a:p>
@@ -1816,7 +1821,7 @@
           <a:p>
             <a:fld id="{FF91FCBC-9B68-4ACD-8DD1-A95F477831F0}" type="datetimeFigureOut">
               <a:rPr lang="en-US" smtClean="0"/>
-              <a:t>10/12/2021</a:t>
+              <a:t>10/14/2021</a:t>
             </a:fld>
             <a:endParaRPr lang="en-US"/>
           </a:p>
@@ -1957,7 +1962,7 @@
           <a:p>
             <a:fld id="{FF91FCBC-9B68-4ACD-8DD1-A95F477831F0}" type="datetimeFigureOut">
               <a:rPr lang="en-US" smtClean="0"/>
-              <a:t>10/12/2021</a:t>
+              <a:t>10/14/2021</a:t>
             </a:fld>
             <a:endParaRPr lang="en-US"/>
           </a:p>
@@ -2070,7 +2075,7 @@
           <a:p>
             <a:fld id="{FF91FCBC-9B68-4ACD-8DD1-A95F477831F0}" type="datetimeFigureOut">
               <a:rPr lang="en-US" smtClean="0"/>
-              <a:t>10/12/2021</a:t>
+              <a:t>10/14/2021</a:t>
             </a:fld>
             <a:endParaRPr lang="en-US"/>
           </a:p>
@@ -2381,7 +2386,7 @@
           <a:p>
             <a:fld id="{FF91FCBC-9B68-4ACD-8DD1-A95F477831F0}" type="datetimeFigureOut">
               <a:rPr lang="en-US" smtClean="0"/>
-              <a:t>10/12/2021</a:t>
+              <a:t>10/14/2021</a:t>
             </a:fld>
             <a:endParaRPr lang="en-US"/>
           </a:p>
@@ -2669,7 +2674,7 @@
           <a:p>
             <a:fld id="{FF91FCBC-9B68-4ACD-8DD1-A95F477831F0}" type="datetimeFigureOut">
               <a:rPr lang="en-US" smtClean="0"/>
-              <a:t>10/12/2021</a:t>
+              <a:t>10/14/2021</a:t>
             </a:fld>
             <a:endParaRPr lang="en-US"/>
           </a:p>
@@ -2910,7 +2915,7 @@
           <a:p>
             <a:fld id="{FF91FCBC-9B68-4ACD-8DD1-A95F477831F0}" type="datetimeFigureOut">
               <a:rPr lang="en-US" smtClean="0"/>
-              <a:t>10/12/2021</a:t>
+              <a:t>10/14/2021</a:t>
             </a:fld>
             <a:endParaRPr lang="en-US"/>
           </a:p>
@@ -3569,6 +3574,68 @@
           </a:prstGeom>
         </p:spPr>
       </p:pic>
+      <p:sp>
+        <p:nvSpPr>
+          <p:cNvPr id="8" name="Title 1">
+            <a:extLst>
+              <a:ext uri="{FF2B5EF4-FFF2-40B4-BE49-F238E27FC236}">
+                <a16:creationId xmlns:a16="http://schemas.microsoft.com/office/drawing/2014/main" id="{D1400D06-3B90-41CA-AFE3-4B9D66007025}"/>
+              </a:ext>
+            </a:extLst>
+          </p:cNvPr>
+          <p:cNvSpPr txBox="1">
+            <a:spLocks/>
+          </p:cNvSpPr>
+          <p:nvPr/>
+        </p:nvSpPr>
+        <p:spPr>
+          <a:xfrm>
+            <a:off x="2939988" y="1120953"/>
+            <a:ext cx="8416030" cy="1325563"/>
+          </a:xfrm>
+          <a:prstGeom prst="rect">
+            <a:avLst/>
+          </a:prstGeom>
+        </p:spPr>
+        <p:txBody>
+          <a:bodyPr vert="horz" lIns="91440" tIns="45720" rIns="91440" bIns="45720" rtlCol="0" anchor="ctr">
+            <a:normAutofit/>
+          </a:bodyPr>
+          <a:lstStyle>
+            <a:lvl1pPr algn="l" defTabSz="914400" rtl="0" eaLnBrk="1" latinLnBrk="0" hangingPunct="1">
+              <a:lnSpc>
+                <a:spcPct val="90000"/>
+              </a:lnSpc>
+              <a:spcBef>
+                <a:spcPct val="0"/>
+              </a:spcBef>
+              <a:buNone/>
+              <a:defRPr sz="4400" kern="1200">
+                <a:solidFill>
+                  <a:schemeClr val="tx1"/>
+                </a:solidFill>
+                <a:latin typeface="+mj-lt"/>
+                <a:ea typeface="+mj-ea"/>
+                <a:cs typeface="+mj-cs"/>
+              </a:defRPr>
+            </a:lvl1pPr>
+          </a:lstStyle>
+          <a:p>
+            <a:r>
+              <a:rPr lang="en-US" sz="2800" u="sng" dirty="0"/>
+              <a:t>Type 1:</a:t>
+            </a:r>
+            <a:r>
+              <a:rPr lang="en-US" sz="2800" dirty="0"/>
+              <a:t>				       </a:t>
+            </a:r>
+            <a:r>
+              <a:rPr lang="en-US" sz="2800" u="sng" dirty="0"/>
+              <a:t>Type 2:</a:t>
+            </a:r>
+          </a:p>
+        </p:txBody>
+      </p:sp>
     </p:spTree>
     <p:extLst>
       <p:ext uri="{BB962C8B-B14F-4D97-AF65-F5344CB8AC3E}">
@@ -3776,6 +3843,68 @@
           </a:prstGeom>
         </p:spPr>
       </p:pic>
+      <p:sp>
+        <p:nvSpPr>
+          <p:cNvPr id="7" name="Title 1">
+            <a:extLst>
+              <a:ext uri="{FF2B5EF4-FFF2-40B4-BE49-F238E27FC236}">
+                <a16:creationId xmlns:a16="http://schemas.microsoft.com/office/drawing/2014/main" id="{1C120CFC-03D1-4F7A-92E3-61836EE6F28C}"/>
+              </a:ext>
+            </a:extLst>
+          </p:cNvPr>
+          <p:cNvSpPr txBox="1">
+            <a:spLocks/>
+          </p:cNvSpPr>
+          <p:nvPr/>
+        </p:nvSpPr>
+        <p:spPr>
+          <a:xfrm>
+            <a:off x="2939988" y="1120953"/>
+            <a:ext cx="8416030" cy="1325563"/>
+          </a:xfrm>
+          <a:prstGeom prst="rect">
+            <a:avLst/>
+          </a:prstGeom>
+        </p:spPr>
+        <p:txBody>
+          <a:bodyPr vert="horz" lIns="91440" tIns="45720" rIns="91440" bIns="45720" rtlCol="0" anchor="ctr">
+            <a:normAutofit/>
+          </a:bodyPr>
+          <a:lstStyle>
+            <a:lvl1pPr algn="l" defTabSz="914400" rtl="0" eaLnBrk="1" latinLnBrk="0" hangingPunct="1">
+              <a:lnSpc>
+                <a:spcPct val="90000"/>
+              </a:lnSpc>
+              <a:spcBef>
+                <a:spcPct val="0"/>
+              </a:spcBef>
+              <a:buNone/>
+              <a:defRPr sz="4400" kern="1200">
+                <a:solidFill>
+                  <a:schemeClr val="tx1"/>
+                </a:solidFill>
+                <a:latin typeface="+mj-lt"/>
+                <a:ea typeface="+mj-ea"/>
+                <a:cs typeface="+mj-cs"/>
+              </a:defRPr>
+            </a:lvl1pPr>
+          </a:lstStyle>
+          <a:p>
+            <a:r>
+              <a:rPr lang="en-US" sz="2800" u="sng" dirty="0"/>
+              <a:t>Type 1:</a:t>
+            </a:r>
+            <a:r>
+              <a:rPr lang="en-US" sz="2800" dirty="0"/>
+              <a:t>				       </a:t>
+            </a:r>
+            <a:r>
+              <a:rPr lang="en-US" sz="2800" u="sng" dirty="0"/>
+              <a:t>Type 2:</a:t>
+            </a:r>
+          </a:p>
+        </p:txBody>
+      </p:sp>
     </p:spTree>
     <p:extLst>
       <p:ext uri="{BB962C8B-B14F-4D97-AF65-F5344CB8AC3E}">
@@ -3983,6 +4112,68 @@
           </a:prstGeom>
         </p:spPr>
       </p:pic>
+      <p:sp>
+        <p:nvSpPr>
+          <p:cNvPr id="7" name="Title 1">
+            <a:extLst>
+              <a:ext uri="{FF2B5EF4-FFF2-40B4-BE49-F238E27FC236}">
+                <a16:creationId xmlns:a16="http://schemas.microsoft.com/office/drawing/2014/main" id="{C185522C-C5C8-4BD8-91E8-DDD5CE0F7FC7}"/>
+              </a:ext>
+            </a:extLst>
+          </p:cNvPr>
+          <p:cNvSpPr txBox="1">
+            <a:spLocks/>
+          </p:cNvSpPr>
+          <p:nvPr/>
+        </p:nvSpPr>
+        <p:spPr>
+          <a:xfrm>
+            <a:off x="2939988" y="1120953"/>
+            <a:ext cx="8416030" cy="1325563"/>
+          </a:xfrm>
+          <a:prstGeom prst="rect">
+            <a:avLst/>
+          </a:prstGeom>
+        </p:spPr>
+        <p:txBody>
+          <a:bodyPr vert="horz" lIns="91440" tIns="45720" rIns="91440" bIns="45720" rtlCol="0" anchor="ctr">
+            <a:normAutofit/>
+          </a:bodyPr>
+          <a:lstStyle>
+            <a:lvl1pPr algn="l" defTabSz="914400" rtl="0" eaLnBrk="1" latinLnBrk="0" hangingPunct="1">
+              <a:lnSpc>
+                <a:spcPct val="90000"/>
+              </a:lnSpc>
+              <a:spcBef>
+                <a:spcPct val="0"/>
+              </a:spcBef>
+              <a:buNone/>
+              <a:defRPr sz="4400" kern="1200">
+                <a:solidFill>
+                  <a:schemeClr val="tx1"/>
+                </a:solidFill>
+                <a:latin typeface="+mj-lt"/>
+                <a:ea typeface="+mj-ea"/>
+                <a:cs typeface="+mj-cs"/>
+              </a:defRPr>
+            </a:lvl1pPr>
+          </a:lstStyle>
+          <a:p>
+            <a:r>
+              <a:rPr lang="en-US" sz="2800" u="sng" dirty="0"/>
+              <a:t>Type 1:</a:t>
+            </a:r>
+            <a:r>
+              <a:rPr lang="en-US" sz="2800" dirty="0"/>
+              <a:t>				       </a:t>
+            </a:r>
+            <a:r>
+              <a:rPr lang="en-US" sz="2800" u="sng" dirty="0"/>
+              <a:t>Type 2:</a:t>
+            </a:r>
+          </a:p>
+        </p:txBody>
+      </p:sp>
     </p:spTree>
     <p:extLst>
       <p:ext uri="{BB962C8B-B14F-4D97-AF65-F5344CB8AC3E}">
@@ -4190,6 +4381,68 @@
           </a:prstGeom>
         </p:spPr>
       </p:pic>
+      <p:sp>
+        <p:nvSpPr>
+          <p:cNvPr id="7" name="Title 1">
+            <a:extLst>
+              <a:ext uri="{FF2B5EF4-FFF2-40B4-BE49-F238E27FC236}">
+                <a16:creationId xmlns:a16="http://schemas.microsoft.com/office/drawing/2014/main" id="{5DFAF9BD-96A4-4268-A3B8-DE7BDA07E9FB}"/>
+              </a:ext>
+            </a:extLst>
+          </p:cNvPr>
+          <p:cNvSpPr txBox="1">
+            <a:spLocks/>
+          </p:cNvSpPr>
+          <p:nvPr/>
+        </p:nvSpPr>
+        <p:spPr>
+          <a:xfrm>
+            <a:off x="2939988" y="1120953"/>
+            <a:ext cx="8416030" cy="1325563"/>
+          </a:xfrm>
+          <a:prstGeom prst="rect">
+            <a:avLst/>
+          </a:prstGeom>
+        </p:spPr>
+        <p:txBody>
+          <a:bodyPr vert="horz" lIns="91440" tIns="45720" rIns="91440" bIns="45720" rtlCol="0" anchor="ctr">
+            <a:normAutofit/>
+          </a:bodyPr>
+          <a:lstStyle>
+            <a:lvl1pPr algn="l" defTabSz="914400" rtl="0" eaLnBrk="1" latinLnBrk="0" hangingPunct="1">
+              <a:lnSpc>
+                <a:spcPct val="90000"/>
+              </a:lnSpc>
+              <a:spcBef>
+                <a:spcPct val="0"/>
+              </a:spcBef>
+              <a:buNone/>
+              <a:defRPr sz="4400" kern="1200">
+                <a:solidFill>
+                  <a:schemeClr val="tx1"/>
+                </a:solidFill>
+                <a:latin typeface="+mj-lt"/>
+                <a:ea typeface="+mj-ea"/>
+                <a:cs typeface="+mj-cs"/>
+              </a:defRPr>
+            </a:lvl1pPr>
+          </a:lstStyle>
+          <a:p>
+            <a:r>
+              <a:rPr lang="en-US" sz="2800" u="sng" dirty="0"/>
+              <a:t>Type 1:</a:t>
+            </a:r>
+            <a:r>
+              <a:rPr lang="en-US" sz="2800" dirty="0"/>
+              <a:t>				       </a:t>
+            </a:r>
+            <a:r>
+              <a:rPr lang="en-US" sz="2800" u="sng" dirty="0"/>
+              <a:t>Type 2:</a:t>
+            </a:r>
+          </a:p>
+        </p:txBody>
+      </p:sp>
     </p:spTree>
     <p:extLst>
       <p:ext uri="{BB962C8B-B14F-4D97-AF65-F5344CB8AC3E}">
@@ -4397,6 +4650,68 @@
           </a:prstGeom>
         </p:spPr>
       </p:pic>
+      <p:sp>
+        <p:nvSpPr>
+          <p:cNvPr id="7" name="Title 1">
+            <a:extLst>
+              <a:ext uri="{FF2B5EF4-FFF2-40B4-BE49-F238E27FC236}">
+                <a16:creationId xmlns:a16="http://schemas.microsoft.com/office/drawing/2014/main" id="{CCCB17A2-9948-44C5-B1F2-742CF9CC2EC7}"/>
+              </a:ext>
+            </a:extLst>
+          </p:cNvPr>
+          <p:cNvSpPr txBox="1">
+            <a:spLocks/>
+          </p:cNvSpPr>
+          <p:nvPr/>
+        </p:nvSpPr>
+        <p:spPr>
+          <a:xfrm>
+            <a:off x="2939988" y="1120953"/>
+            <a:ext cx="8416030" cy="1325563"/>
+          </a:xfrm>
+          <a:prstGeom prst="rect">
+            <a:avLst/>
+          </a:prstGeom>
+        </p:spPr>
+        <p:txBody>
+          <a:bodyPr vert="horz" lIns="91440" tIns="45720" rIns="91440" bIns="45720" rtlCol="0" anchor="ctr">
+            <a:normAutofit/>
+          </a:bodyPr>
+          <a:lstStyle>
+            <a:lvl1pPr algn="l" defTabSz="914400" rtl="0" eaLnBrk="1" latinLnBrk="0" hangingPunct="1">
+              <a:lnSpc>
+                <a:spcPct val="90000"/>
+              </a:lnSpc>
+              <a:spcBef>
+                <a:spcPct val="0"/>
+              </a:spcBef>
+              <a:buNone/>
+              <a:defRPr sz="4400" kern="1200">
+                <a:solidFill>
+                  <a:schemeClr val="tx1"/>
+                </a:solidFill>
+                <a:latin typeface="+mj-lt"/>
+                <a:ea typeface="+mj-ea"/>
+                <a:cs typeface="+mj-cs"/>
+              </a:defRPr>
+            </a:lvl1pPr>
+          </a:lstStyle>
+          <a:p>
+            <a:r>
+              <a:rPr lang="en-US" sz="2800" u="sng" dirty="0"/>
+              <a:t>Type 1:</a:t>
+            </a:r>
+            <a:r>
+              <a:rPr lang="en-US" sz="2800" dirty="0"/>
+              <a:t>				       </a:t>
+            </a:r>
+            <a:r>
+              <a:rPr lang="en-US" sz="2800" u="sng" dirty="0"/>
+              <a:t>Type 2:</a:t>
+            </a:r>
+          </a:p>
+        </p:txBody>
+      </p:sp>
     </p:spTree>
     <p:extLst>
       <p:ext uri="{BB962C8B-B14F-4D97-AF65-F5344CB8AC3E}">
@@ -4604,6 +4919,68 @@
           </a:prstGeom>
         </p:spPr>
       </p:pic>
+      <p:sp>
+        <p:nvSpPr>
+          <p:cNvPr id="7" name="Title 1">
+            <a:extLst>
+              <a:ext uri="{FF2B5EF4-FFF2-40B4-BE49-F238E27FC236}">
+                <a16:creationId xmlns:a16="http://schemas.microsoft.com/office/drawing/2014/main" id="{3632D850-42E9-446C-9535-3B5BAC8635C2}"/>
+              </a:ext>
+            </a:extLst>
+          </p:cNvPr>
+          <p:cNvSpPr txBox="1">
+            <a:spLocks/>
+          </p:cNvSpPr>
+          <p:nvPr/>
+        </p:nvSpPr>
+        <p:spPr>
+          <a:xfrm>
+            <a:off x="2939988" y="1120953"/>
+            <a:ext cx="8416030" cy="1325563"/>
+          </a:xfrm>
+          <a:prstGeom prst="rect">
+            <a:avLst/>
+          </a:prstGeom>
+        </p:spPr>
+        <p:txBody>
+          <a:bodyPr vert="horz" lIns="91440" tIns="45720" rIns="91440" bIns="45720" rtlCol="0" anchor="ctr">
+            <a:normAutofit/>
+          </a:bodyPr>
+          <a:lstStyle>
+            <a:lvl1pPr algn="l" defTabSz="914400" rtl="0" eaLnBrk="1" latinLnBrk="0" hangingPunct="1">
+              <a:lnSpc>
+                <a:spcPct val="90000"/>
+              </a:lnSpc>
+              <a:spcBef>
+                <a:spcPct val="0"/>
+              </a:spcBef>
+              <a:buNone/>
+              <a:defRPr sz="4400" kern="1200">
+                <a:solidFill>
+                  <a:schemeClr val="tx1"/>
+                </a:solidFill>
+                <a:latin typeface="+mj-lt"/>
+                <a:ea typeface="+mj-ea"/>
+                <a:cs typeface="+mj-cs"/>
+              </a:defRPr>
+            </a:lvl1pPr>
+          </a:lstStyle>
+          <a:p>
+            <a:r>
+              <a:rPr lang="en-US" sz="2800" u="sng" dirty="0"/>
+              <a:t>Type 1:</a:t>
+            </a:r>
+            <a:r>
+              <a:rPr lang="en-US" sz="2800" dirty="0"/>
+              <a:t>				       </a:t>
+            </a:r>
+            <a:r>
+              <a:rPr lang="en-US" sz="2800" u="sng" dirty="0"/>
+              <a:t>Type 2:</a:t>
+            </a:r>
+          </a:p>
+        </p:txBody>
+      </p:sp>
     </p:spTree>
     <p:extLst>
       <p:ext uri="{BB962C8B-B14F-4D97-AF65-F5344CB8AC3E}">

</xml_diff>